<commit_message>
Fixed homework descriptions. Fixed homework 5.
</commit_message>
<xml_diff>
--- a/week2/week2.pptx
+++ b/week2/week2.pptx
@@ -9599,13 +9599,8 @@
           <a:p>
             <a:r>
               <a:rPr lang="en-GB" b="1" dirty="0" smtClean="0"/>
-              <a:t>Week2, </a:t>
-            </a:r>
-            <a:r>
-              <a:rPr lang="en-GB" b="1" dirty="0" smtClean="0"/>
-              <a:t>Homework1</a:t>
-            </a:r>
-            <a:endParaRPr lang="en-GB" b="1" dirty="0" smtClean="0"/>
+              <a:t>Week2, Homework1</a:t>
+            </a:r>
           </a:p>
           <a:p>
             <a:pPr lvl="1"/>
@@ -9727,7 +9722,6 @@
               <a:rPr lang="en-GB" b="1" dirty="0" smtClean="0"/>
               <a:t>Week2, Homework2</a:t>
             </a:r>
-            <a:endParaRPr lang="en-GB" b="1" dirty="0" smtClean="0"/>
           </a:p>
           <a:p>
             <a:pPr lvl="1"/>
@@ -9745,7 +9739,6 @@
               <a:rPr lang="en-GB" b="1" dirty="0" smtClean="0"/>
               <a:t>Week2, Homework3</a:t>
             </a:r>
-            <a:endParaRPr lang="en-GB" b="1" dirty="0" smtClean="0"/>
           </a:p>
           <a:p>
             <a:pPr lvl="1"/>
@@ -9853,7 +9846,6 @@
               <a:rPr lang="en-GB" b="1" dirty="0" smtClean="0"/>
               <a:t>Week2, Homework4</a:t>
             </a:r>
-            <a:endParaRPr lang="en-GB" b="1" dirty="0" smtClean="0"/>
           </a:p>
           <a:p>
             <a:endParaRPr lang="en-GB" b="1" u="sng" dirty="0">
@@ -10569,11 +10561,7 @@
           <a:p>
             <a:r>
               <a:rPr lang="en-GB" dirty="0" smtClean="0"/>
-              <a:t>Homewor</a:t>
-            </a:r>
-            <a:r>
-              <a:rPr lang="en-GB" dirty="0" smtClean="0"/>
-              <a:t>k.</a:t>
+              <a:t>Homework.</a:t>
             </a:r>
             <a:endParaRPr lang="en-GB" dirty="0"/>
           </a:p>
@@ -10605,7 +10593,6 @@
               <a:rPr lang="en-GB" b="1" dirty="0" smtClean="0"/>
               <a:t>Week2, Homework5</a:t>
             </a:r>
-            <a:endParaRPr lang="en-GB" b="1" dirty="0" smtClean="0"/>
           </a:p>
           <a:p>
             <a:endParaRPr lang="en-GB" b="1" u="sng" dirty="0">
@@ -10617,8 +10604,17 @@
           <a:p>
             <a:r>
               <a:rPr lang="en-GB" dirty="0" smtClean="0"/>
-              <a:t>Write a program to add up all the numbers between 1 and 999.</a:t>
-            </a:r>
+              <a:t>Write a program to add up all the numbers between 1 </a:t>
+            </a:r>
+            <a:r>
+              <a:rPr lang="en-GB" smtClean="0"/>
+              <a:t>and </a:t>
+            </a:r>
+            <a:r>
+              <a:rPr lang="en-GB" smtClean="0"/>
+              <a:t>1000.</a:t>
+            </a:r>
+            <a:endParaRPr lang="en-GB" dirty="0" smtClean="0"/>
           </a:p>
           <a:p>
             <a:endParaRPr lang="en-GB" dirty="0"/>

</xml_diff>